<commit_message>
Compressible Fluid Flow Art
Compressible Fluid Flow Art
</commit_message>
<xml_diff>
--- a/Posts/2020/Nov/UndertheHood/Converging_diverging_nozzle.pptx
+++ b/Posts/2020/Nov/UndertheHood/Converging_diverging_nozzle.pptx
@@ -260,7 +260,7 @@
           <a:p>
             <a:fld id="{90885F19-7195-4343-9CC3-AADB0D9ABDED}" type="datetimeFigureOut">
               <a:rPr lang="en-US" smtClean="0"/>
-              <a:t>12/26/2020</a:t>
+              <a:t>1/13/2021</a:t>
             </a:fld>
             <a:endParaRPr lang="en-US"/>
           </a:p>
@@ -458,7 +458,7 @@
           <a:p>
             <a:fld id="{90885F19-7195-4343-9CC3-AADB0D9ABDED}" type="datetimeFigureOut">
               <a:rPr lang="en-US" smtClean="0"/>
-              <a:t>12/26/2020</a:t>
+              <a:t>1/13/2021</a:t>
             </a:fld>
             <a:endParaRPr lang="en-US"/>
           </a:p>
@@ -666,7 +666,7 @@
           <a:p>
             <a:fld id="{90885F19-7195-4343-9CC3-AADB0D9ABDED}" type="datetimeFigureOut">
               <a:rPr lang="en-US" smtClean="0"/>
-              <a:t>12/26/2020</a:t>
+              <a:t>1/13/2021</a:t>
             </a:fld>
             <a:endParaRPr lang="en-US"/>
           </a:p>
@@ -864,7 +864,7 @@
           <a:p>
             <a:fld id="{90885F19-7195-4343-9CC3-AADB0D9ABDED}" type="datetimeFigureOut">
               <a:rPr lang="en-US" smtClean="0"/>
-              <a:t>12/26/2020</a:t>
+              <a:t>1/13/2021</a:t>
             </a:fld>
             <a:endParaRPr lang="en-US"/>
           </a:p>
@@ -1139,7 +1139,7 @@
           <a:p>
             <a:fld id="{90885F19-7195-4343-9CC3-AADB0D9ABDED}" type="datetimeFigureOut">
               <a:rPr lang="en-US" smtClean="0"/>
-              <a:t>12/26/2020</a:t>
+              <a:t>1/13/2021</a:t>
             </a:fld>
             <a:endParaRPr lang="en-US"/>
           </a:p>
@@ -1404,7 +1404,7 @@
           <a:p>
             <a:fld id="{90885F19-7195-4343-9CC3-AADB0D9ABDED}" type="datetimeFigureOut">
               <a:rPr lang="en-US" smtClean="0"/>
-              <a:t>12/26/2020</a:t>
+              <a:t>1/13/2021</a:t>
             </a:fld>
             <a:endParaRPr lang="en-US"/>
           </a:p>
@@ -1816,7 +1816,7 @@
           <a:p>
             <a:fld id="{90885F19-7195-4343-9CC3-AADB0D9ABDED}" type="datetimeFigureOut">
               <a:rPr lang="en-US" smtClean="0"/>
-              <a:t>12/26/2020</a:t>
+              <a:t>1/13/2021</a:t>
             </a:fld>
             <a:endParaRPr lang="en-US"/>
           </a:p>
@@ -1957,7 +1957,7 @@
           <a:p>
             <a:fld id="{90885F19-7195-4343-9CC3-AADB0D9ABDED}" type="datetimeFigureOut">
               <a:rPr lang="en-US" smtClean="0"/>
-              <a:t>12/26/2020</a:t>
+              <a:t>1/13/2021</a:t>
             </a:fld>
             <a:endParaRPr lang="en-US"/>
           </a:p>
@@ -2070,7 +2070,7 @@
           <a:p>
             <a:fld id="{90885F19-7195-4343-9CC3-AADB0D9ABDED}" type="datetimeFigureOut">
               <a:rPr lang="en-US" smtClean="0"/>
-              <a:t>12/26/2020</a:t>
+              <a:t>1/13/2021</a:t>
             </a:fld>
             <a:endParaRPr lang="en-US"/>
           </a:p>
@@ -2381,7 +2381,7 @@
           <a:p>
             <a:fld id="{90885F19-7195-4343-9CC3-AADB0D9ABDED}" type="datetimeFigureOut">
               <a:rPr lang="en-US" smtClean="0"/>
-              <a:t>12/26/2020</a:t>
+              <a:t>1/13/2021</a:t>
             </a:fld>
             <a:endParaRPr lang="en-US"/>
           </a:p>
@@ -2669,7 +2669,7 @@
           <a:p>
             <a:fld id="{90885F19-7195-4343-9CC3-AADB0D9ABDED}" type="datetimeFigureOut">
               <a:rPr lang="en-US" smtClean="0"/>
-              <a:t>12/26/2020</a:t>
+              <a:t>1/13/2021</a:t>
             </a:fld>
             <a:endParaRPr lang="en-US"/>
           </a:p>
@@ -2910,7 +2910,7 @@
           <a:p>
             <a:fld id="{90885F19-7195-4343-9CC3-AADB0D9ABDED}" type="datetimeFigureOut">
               <a:rPr lang="en-US" smtClean="0"/>
-              <a:t>12/26/2020</a:t>
+              <a:t>1/13/2021</a:t>
             </a:fld>
             <a:endParaRPr lang="en-US"/>
           </a:p>
@@ -6058,6 +6058,35 @@
           </p:sp>
         </mc:Fallback>
       </mc:AlternateContent>
+      <p:pic>
+        <p:nvPicPr>
+          <p:cNvPr id="3" name="Picture 2">
+            <a:extLst>
+              <a:ext uri="{FF2B5EF4-FFF2-40B4-BE49-F238E27FC236}">
+                <a16:creationId xmlns:a16="http://schemas.microsoft.com/office/drawing/2014/main" id="{BA1CF23A-0373-4E49-90D5-CD2B415C585E}"/>
+              </a:ext>
+            </a:extLst>
+          </p:cNvPr>
+          <p:cNvPicPr>
+            <a:picLocks noChangeAspect="1"/>
+          </p:cNvPicPr>
+          <p:nvPr/>
+        </p:nvPicPr>
+        <p:blipFill rotWithShape="1">
+          <a:blip r:embed="rId4"/>
+          <a:srcRect l="26765" t="46582" r="29178" b="40375"/>
+          <a:stretch/>
+        </p:blipFill>
+        <p:spPr>
+          <a:xfrm>
+            <a:off x="981181" y="5475475"/>
+            <a:ext cx="4720977" cy="894503"/>
+          </a:xfrm>
+          <a:prstGeom prst="rect">
+            <a:avLst/>
+          </a:prstGeom>
+        </p:spPr>
+      </p:pic>
     </p:spTree>
     <p:extLst>
       <p:ext uri="{BB962C8B-B14F-4D97-AF65-F5344CB8AC3E}">

</xml_diff>